<commit_message>
Update Project Presentation - Data Wranglers.pptx
</commit_message>
<xml_diff>
--- a/Project Presentation - Data Wranglers.pptx
+++ b/Project Presentation - Data Wranglers.pptx
@@ -4049,8 +4049,8 @@
             </a:lnSpc>
           </a:pPr>
           <a:r>
-            <a:rPr lang="en-IN"/>
-            <a:t>Creation of data frame CSVs</a:t>
+            <a:rPr lang="en-IN" dirty="0"/>
+            <a:t>Creation of data frame</a:t>
           </a:r>
           <a:endParaRPr lang="en-US" dirty="0"/>
         </a:p>
@@ -5830,8 +5830,8 @@
             <a:buNone/>
           </a:pPr>
           <a:r>
-            <a:rPr lang="en-IN" sz="2000" kern="1200"/>
-            <a:t>Creation of data frame CSVs</a:t>
+            <a:rPr lang="en-IN" sz="2000" kern="1200" dirty="0"/>
+            <a:t>Creation of data frame</a:t>
           </a:r>
           <a:endParaRPr lang="en-US" sz="2000" kern="1200" dirty="0"/>
         </a:p>
@@ -15124,11 +15124,11 @@
           <a:lstStyle/>
           <a:p>
             <a:r>
-              <a:rPr lang="en-IN" sz="2000"/>
-              <a:t>Group Project – DATA422		Professor - </a:t>
+              <a:rPr lang="en-IN" sz="2000" dirty="0"/>
+              <a:t>Group Project – DATA422		Professors - </a:t>
             </a:r>
             <a:r>
-              <a:rPr lang="en-IN" sz="2000" b="0" i="0">
+              <a:rPr lang="en-IN" sz="2000" b="0" i="0" dirty="0">
                 <a:solidFill>
                   <a:srgbClr val="323130"/>
                 </a:solidFill>
@@ -15403,11 +15403,7 @@
             </a:r>
             <a:r>
               <a:rPr lang="en-IN" sz="1600" dirty="0"/>
-              <a:t> </a:t>
-            </a:r>
-            <a:r>
-              <a:rPr lang="en-IN" sz="1600" dirty="0" err="1"/>
-              <a:t>Krishnana</a:t>
+              <a:t> Krishnan</a:t>
             </a:r>
             <a:r>
               <a:rPr lang="en-IN" sz="1600" dirty="0">
@@ -17634,7 +17630,7 @@
       </p:grpSpPr>
       <p:sp useBgFill="1">
         <p:nvSpPr>
-          <p:cNvPr id="9" name="Rectangle 8">
+          <p:cNvPr id="24" name="Rectangle 23">
             <a:extLst>
               <a:ext uri="{FF2B5EF4-FFF2-40B4-BE49-F238E27FC236}">
                 <a16:creationId xmlns:a16="http://schemas.microsoft.com/office/drawing/2014/main" id="{201CC55D-ED54-4C5C-95E6-10947BD1103B}"/>
@@ -17729,7 +17725,7 @@
       </p:sp>
       <p:grpSp>
         <p:nvGrpSpPr>
-          <p:cNvPr id="11" name="Group 10">
+          <p:cNvPr id="26" name="Group 25">
             <a:extLst>
               <a:ext uri="{FF2B5EF4-FFF2-40B4-BE49-F238E27FC236}">
                 <a16:creationId xmlns:a16="http://schemas.microsoft.com/office/drawing/2014/main" id="{1DE889C7-FAD6-4397-98E2-05D503484459}"/>
@@ -17760,7 +17756,7 @@
         </p:grpSpPr>
         <p:sp>
           <p:nvSpPr>
-            <p:cNvPr id="12" name="Rectangle 11">
+            <p:cNvPr id="27" name="Rectangle 26">
               <a:extLst>
                 <a:ext uri="{FF2B5EF4-FFF2-40B4-BE49-F238E27FC236}">
                   <a16:creationId xmlns:a16="http://schemas.microsoft.com/office/drawing/2014/main" id="{F399A70F-F8CD-4992-9EF5-6CF15472E73F}"/>
@@ -17821,7 +17817,7 @@
         </p:sp>
         <p:sp>
           <p:nvSpPr>
-            <p:cNvPr id="13" name="Rectangle 12">
+            <p:cNvPr id="28" name="Rectangle 27">
               <a:extLst>
                 <a:ext uri="{FF2B5EF4-FFF2-40B4-BE49-F238E27FC236}">
                   <a16:creationId xmlns:a16="http://schemas.microsoft.com/office/drawing/2014/main" id="{48F4FEDC-6D80-458C-A665-075D9B9500FD}"/>
@@ -17883,7 +17879,7 @@
       </p:grpSp>
       <p:sp>
         <p:nvSpPr>
-          <p:cNvPr id="15" name="Rectangle 14">
+          <p:cNvPr id="30" name="Rectangle 29">
             <a:extLst>
               <a:ext uri="{FF2B5EF4-FFF2-40B4-BE49-F238E27FC236}">
                 <a16:creationId xmlns:a16="http://schemas.microsoft.com/office/drawing/2014/main" id="{3873B707-463F-40B0-8227-E8CC6C67EB25}"/>
@@ -17982,7 +17978,7 @@
               <a:buChar char="•"/>
             </a:pPr>
             <a:r>
-              <a:rPr lang="en-US" sz="2000" dirty="0" err="1"/>
+              <a:rPr lang="en-US" sz="2000"/>
               <a:t>Jupyter</a:t>
             </a:r>
             <a:r>
@@ -18023,7 +18019,7 @@
       </p:sp>
       <p:sp>
         <p:nvSpPr>
-          <p:cNvPr id="17" name="Rectangle 16">
+          <p:cNvPr id="32" name="Rectangle 31">
             <a:extLst>
               <a:ext uri="{FF2B5EF4-FFF2-40B4-BE49-F238E27FC236}">
                 <a16:creationId xmlns:a16="http://schemas.microsoft.com/office/drawing/2014/main" id="{C13237C8-E62C-4F0D-A318-BD6FB6C2D138}"/>
@@ -18086,7 +18082,7 @@
       </p:sp>
       <p:sp>
         <p:nvSpPr>
-          <p:cNvPr id="19" name="Rectangle 18">
+          <p:cNvPr id="34" name="Rectangle 33">
             <a:extLst>
               <a:ext uri="{FF2B5EF4-FFF2-40B4-BE49-F238E27FC236}">
                 <a16:creationId xmlns:a16="http://schemas.microsoft.com/office/drawing/2014/main" id="{19C9EAEA-39D0-4B0E-A0EB-51E7B26740B1}"/>
@@ -18156,10 +18152,10 @@
       </p:sp>
       <p:pic>
         <p:nvPicPr>
-          <p:cNvPr id="4" name="Picture 3">
+          <p:cNvPr id="5" name="Picture 4" descr="Graphical user interface&#10;&#10;Description automatically generated">
             <a:extLst>
               <a:ext uri="{FF2B5EF4-FFF2-40B4-BE49-F238E27FC236}">
-                <a16:creationId xmlns:a16="http://schemas.microsoft.com/office/drawing/2014/main" id="{5E8986BE-25ED-4292-8CEA-F1D12A6DD807}"/>
+                <a16:creationId xmlns:a16="http://schemas.microsoft.com/office/drawing/2014/main" id="{ED91C964-3D78-4E8E-8B4E-A689913D820E}"/>
               </a:ext>
             </a:extLst>
           </p:cNvPr>
@@ -18170,7 +18166,7 @@
         </p:nvPicPr>
         <p:blipFill rotWithShape="1">
           <a:blip r:embed="rId2"/>
-          <a:srcRect r="32691" b="2"/>
+          <a:srcRect r="30110"/>
           <a:stretch/>
         </p:blipFill>
         <p:spPr>
@@ -19194,7 +19190,7 @@
                   <a:srgbClr val="000000"/>
                 </a:solidFill>
               </a:rPr>
-              <a:t>Research Questions</a:t>
+              <a:t>Questions</a:t>
             </a:r>
           </a:p>
           <a:p>
@@ -19245,6 +19241,16 @@
                 </a:solidFill>
               </a:rPr>
               <a:t>Results</a:t>
+            </a:r>
+          </a:p>
+          <a:p>
+            <a:r>
+              <a:rPr lang="en-IN" sz="1900" dirty="0">
+                <a:solidFill>
+                  <a:srgbClr val="000000"/>
+                </a:solidFill>
+              </a:rPr>
+              <a:t>Tools Used</a:t>
             </a:r>
           </a:p>
           <a:p>
@@ -19428,7 +19434,7 @@
           <a:lstStyle/>
           <a:p>
             <a:r>
-              <a:rPr lang="en-US" kern="1200">
+              <a:rPr lang="en-US" kern="1200" dirty="0">
                 <a:solidFill>
                   <a:srgbClr val="FFFFFF"/>
                 </a:solidFill>
@@ -19436,7 +19442,7 @@
                 <a:ea typeface="+mj-ea"/>
                 <a:cs typeface="+mj-cs"/>
               </a:rPr>
-              <a:t>Research Questions</a:t>
+              <a:t>Questions</a:t>
             </a:r>
           </a:p>
         </p:txBody>
@@ -21356,7 +21362,7 @@
             <p:ph idx="1"/>
             <p:extLst>
               <p:ext uri="{D42A27DB-BD31-4B8C-83A1-F6EECF244321}">
-                <p14:modId xmlns:p14="http://schemas.microsoft.com/office/powerpoint/2010/main" val="1175214702"/>
+                <p14:modId xmlns:p14="http://schemas.microsoft.com/office/powerpoint/2010/main" val="821966365"/>
               </p:ext>
             </p:extLst>
           </p:nvPr>

</xml_diff>